<commit_message>
Added design diagram to the presentation
</commit_message>
<xml_diff>
--- a/DeceptionDetective.pptx
+++ b/DeceptionDetective.pptx
@@ -17266,6 +17266,73 @@
           </a:p>
         </p:txBody>
       </p:sp>
+      <p:pic>
+        <p:nvPicPr>
+          <p:cNvPr id="5" name="Picture 4">
+            <a:extLst>
+              <a:ext uri="{FF2B5EF4-FFF2-40B4-BE49-F238E27FC236}">
+                <a16:creationId xmlns:a16="http://schemas.microsoft.com/office/drawing/2014/main" id="{FEB6C351-6009-4AFC-926A-8BB6B9170B7F}"/>
+              </a:ext>
+            </a:extLst>
+          </p:cNvPr>
+          <p:cNvPicPr>
+            <a:picLocks noChangeAspect="1"/>
+          </p:cNvPicPr>
+          <p:nvPr/>
+        </p:nvPicPr>
+        <p:blipFill>
+          <a:blip r:embed="rId2"/>
+          <a:stretch>
+            <a:fillRect/>
+          </a:stretch>
+        </p:blipFill>
+        <p:spPr>
+          <a:xfrm>
+            <a:off x="1228865" y="0"/>
+            <a:ext cx="6686270" cy="2434635"/>
+          </a:xfrm>
+          <a:prstGeom prst="rect">
+            <a:avLst/>
+          </a:prstGeom>
+        </p:spPr>
+      </p:pic>
+      <p:sp>
+        <p:nvSpPr>
+          <p:cNvPr id="8" name="TextBox 7">
+            <a:extLst>
+              <a:ext uri="{FF2B5EF4-FFF2-40B4-BE49-F238E27FC236}">
+                <a16:creationId xmlns:a16="http://schemas.microsoft.com/office/drawing/2014/main" id="{26F21A16-7954-4814-AA87-ADE3177F3098}"/>
+              </a:ext>
+            </a:extLst>
+          </p:cNvPr>
+          <p:cNvSpPr txBox="1"/>
+          <p:nvPr/>
+        </p:nvSpPr>
+        <p:spPr>
+          <a:xfrm>
+            <a:off x="1228865" y="2796272"/>
+            <a:ext cx="6686270" cy="1200329"/>
+          </a:xfrm>
+          <a:prstGeom prst="rect">
+            <a:avLst/>
+          </a:prstGeom>
+          <a:noFill/>
+        </p:spPr>
+        <p:txBody>
+          <a:bodyPr wrap="square" rtlCol="0">
+            <a:spAutoFit/>
+          </a:bodyPr>
+          <a:lstStyle/>
+          <a:p>
+            <a:r>
+              <a:rPr lang="en-US" sz="1800" dirty="0">
+                <a:latin typeface="Barlow Light" panose="020B0604020202020204" charset="0"/>
+              </a:rPr>
+              <a:t>Our project consists of three main components: the web extension front-end, the statement-finder backend, and the fact-checker backend. The above design diagram for our project shows how these components work together.</a:t>
+            </a:r>
+          </a:p>
+        </p:txBody>
+      </p:sp>
     </p:spTree>
     <p:extLst>
       <p:ext uri="{BB962C8B-B14F-4D97-AF65-F5344CB8AC3E}">
@@ -17359,6 +17426,87 @@
               <a:t>8</a:t>
             </a:fld>
             <a:endParaRPr lang="en"/>
+          </a:p>
+        </p:txBody>
+      </p:sp>
+      <p:sp>
+        <p:nvSpPr>
+          <p:cNvPr id="4" name="TextBox 3">
+            <a:extLst>
+              <a:ext uri="{FF2B5EF4-FFF2-40B4-BE49-F238E27FC236}">
+                <a16:creationId xmlns:a16="http://schemas.microsoft.com/office/drawing/2014/main" id="{758AA5F7-DCD5-4193-9629-326606D7922B}"/>
+              </a:ext>
+            </a:extLst>
+          </p:cNvPr>
+          <p:cNvSpPr txBox="1"/>
+          <p:nvPr/>
+        </p:nvSpPr>
+        <p:spPr>
+          <a:xfrm>
+            <a:off x="1193343" y="1309866"/>
+            <a:ext cx="6757313" cy="2523768"/>
+          </a:xfrm>
+          <a:prstGeom prst="rect">
+            <a:avLst/>
+          </a:prstGeom>
+          <a:noFill/>
+        </p:spPr>
+        <p:txBody>
+          <a:bodyPr wrap="square" rtlCol="0">
+            <a:spAutoFit/>
+          </a:bodyPr>
+          <a:lstStyle/>
+          <a:p>
+            <a:pPr>
+              <a:spcBef>
+                <a:spcPts val="1200"/>
+              </a:spcBef>
+            </a:pPr>
+            <a:r>
+              <a:rPr lang="en-US" sz="1600" dirty="0">
+                <a:latin typeface="Barlow Light" panose="020B0604020202020204" charset="0"/>
+              </a:rPr>
+              <a:t>Web extension: The user interacts with the extension to activate the tool</a:t>
+            </a:r>
+          </a:p>
+          <a:p>
+            <a:pPr>
+              <a:spcBef>
+                <a:spcPts val="1200"/>
+              </a:spcBef>
+            </a:pPr>
+            <a:r>
+              <a:rPr lang="en-US" sz="1600" dirty="0">
+                <a:latin typeface="Barlow Light" panose="020B0604020202020204" charset="0"/>
+              </a:rPr>
+              <a:t>Statement-finder: The input from the web extension is processed to create a list of statements within the provided text</a:t>
+            </a:r>
+          </a:p>
+          <a:p>
+            <a:pPr>
+              <a:spcBef>
+                <a:spcPts val="1200"/>
+              </a:spcBef>
+            </a:pPr>
+            <a:r>
+              <a:rPr lang="en-US" sz="1600" dirty="0">
+                <a:latin typeface="Barlow Light" panose="020B0604020202020204" charset="0"/>
+              </a:rPr>
+              <a:t>Fact-checker: Each statement is checked against one or more online source to determine its factual integrity</a:t>
+            </a:r>
+          </a:p>
+          <a:p>
+            <a:pPr>
+              <a:spcBef>
+                <a:spcPts val="1200"/>
+              </a:spcBef>
+            </a:pPr>
+            <a:r>
+              <a:rPr lang="en-US" sz="1600" dirty="0">
+                <a:latin typeface="Barlow Light" panose="020B0604020202020204" charset="0"/>
+              </a:rPr>
+              <a:t>Frontend: Using the statements and their results from the fact-checker tool, a report is displayed to show each statement’s factuality rating and citation links for the user to explore </a:t>
+            </a:r>
           </a:p>
         </p:txBody>
       </p:sp>

</xml_diff>

<commit_message>
edited poster and presentation
</commit_message>
<xml_diff>
--- a/DeceptionDetective.pptx
+++ b/DeceptionDetective.pptx
@@ -14563,7 +14563,7 @@
           <a:p>
             <a:r>
               <a:rPr lang="en-US" sz="1800" dirty="0"/>
-              <a:t>Spacy: Another natural language processing library in Python. We used this for part-of-speech tagging in our atomic statement finder function</a:t>
+              <a:t>Spacy: Another natural language processing library in Python. We used this for dependency and part-of-speech tagging in our atomic statement finder function</a:t>
             </a:r>
           </a:p>
           <a:p>
@@ -16352,13 +16352,6 @@
             </a:r>
           </a:p>
           <a:p>
-            <a:pPr lvl="1"/>
-            <a:r>
-              <a:rPr lang="en-US" sz="1600" dirty="0"/>
-              <a:t>We were able to define some base statement structures to work from. We plan to build upon these to increase the effectiveness of the tool</a:t>
-            </a:r>
-          </a:p>
-          <a:p>
             <a:r>
               <a:rPr lang="en-US" sz="1800" dirty="0"/>
               <a:t>To-do….</a:t>

</xml_diff>

<commit_message>
Added changes to presentation materials and a README for the web crawlers
</commit_message>
<xml_diff>
--- a/DeceptionDetective.pptx
+++ b/DeceptionDetective.pptx
@@ -283,6 +283,16 @@
     </p:ext>
   </p:extLst>
 </p:presentation>
+</file>
+
+<file path=ppt/revisionInfo.xml><?xml version="1.0" encoding="utf-8"?>
+<p1510:revInfo xmlns:a="http://schemas.openxmlformats.org/drawingml/2006/main" xmlns:r="http://schemas.openxmlformats.org/officeDocument/2006/relationships" xmlns:p1510="http://schemas.microsoft.com/office/powerpoint/2015/10/main">
+  <p1510:revLst>
+    <p1510:client id="{0ACEB69F-6011-B000-CC7C-E73293EE65B8}" v="589" dt="2021-03-22T16:34:18.427"/>
+    <p1510:client id="{7C90E2CB-3F40-A1F7-3533-6D485DD96C35}" v="162" dt="2021-03-22T16:09:59.738"/>
+    <p1510:client id="{FF60C105-6821-CF78-DDC2-D96DEB927C73}" v="53" dt="2021-03-19T16:08:58.718"/>
+  </p1510:revLst>
+</p1510:revInfo>
 </file>
 
 <file path=ppt/notesMasters/notesMaster1.xml><?xml version="1.0" encoding="utf-8"?>
@@ -14698,7 +14708,18 @@
           <a:p>
             <a:r>
               <a:rPr lang="en-US" sz="1800" dirty="0"/>
-              <a:t>To do – Lando Slide</a:t>
+              <a:t>Beautiful Soup – a Python library that allows smooth HTML parsing and splitting. Finding specific element tags and checking them for desired content such as links or paragraph text is at the crux of our web scrapers.</a:t>
+            </a:r>
+          </a:p>
+          <a:p>
+            <a:pPr>
+              <a:lnSpc>
+                <a:spcPct val="114999"/>
+              </a:lnSpc>
+            </a:pPr>
+            <a:r>
+              <a:rPr lang="en-US" sz="1800" dirty="0"/>
+              <a:t>requests – a Python library with tools to query website URLs straight from script code. We use the request() method to retrieve the HTML from the links we're interested in. The HTML is then passed into a Beautiful Soup object.</a:t>
             </a:r>
           </a:p>
           <a:p>
@@ -15703,7 +15724,7 @@
           <a:p>
             <a:r>
               <a:rPr lang="en-US" sz="1800" dirty="0"/>
-              <a:t>To-do – specifics on back-end</a:t>
+              <a:t>Web scraper that parses Wikipedia and Snopes pages for fact-check ratings plus text content</a:t>
             </a:r>
           </a:p>
         </p:txBody>
@@ -16342,7 +16363,7 @@
           <a:p>
             <a:r>
               <a:rPr lang="en-US" sz="1800" dirty="0"/>
-              <a:t>Deeper web crawling?</a:t>
+              <a:t>Efficient web crawling and scraping</a:t>
             </a:r>
           </a:p>
           <a:p>
@@ -16354,7 +16375,7 @@
           <a:p>
             <a:r>
               <a:rPr lang="en-US" sz="1800" dirty="0"/>
-              <a:t>To-do….</a:t>
+              <a:t>Speeding up our software execution time for scalability</a:t>
             </a:r>
           </a:p>
         </p:txBody>
@@ -16889,29 +16910,28 @@
           </a:p>
           <a:p>
             <a:r>
-              <a:rPr lang="en-US" dirty="0">
-                <a:highlight>
-                  <a:srgbClr val="FFFF00"/>
-                </a:highlight>
-              </a:rPr>
-              <a:t>To do: </a:t>
+              <a:rPr lang="en-US" dirty="0"/>
+              <a:t>"Website Scraping and Crawling"</a:t>
             </a:r>
+          </a:p>
+          <a:p>
+            <a:pPr lvl="1">
+              <a:lnSpc>
+                <a:spcPct val="114999"/>
+              </a:lnSpc>
+            </a:pPr>
             <a:r>
-              <a:rPr lang="en-US" dirty="0" err="1">
-                <a:highlight>
-                  <a:srgbClr val="FFFF00"/>
-                </a:highlight>
-              </a:rPr>
-              <a:t>Lando</a:t>
+              <a:rPr lang="en-US" sz="2000" dirty="0"/>
+              <a:t>Querying a URL, reading the website's content, sorting the content for links to other pages, and consequently querying the links retrieved</a:t>
             </a:r>
-            <a:r>
-              <a:rPr lang="en-US" dirty="0">
-                <a:highlight>
-                  <a:srgbClr val="FFFF00"/>
-                </a:highlight>
-              </a:rPr>
-              <a:t>?</a:t>
-            </a:r>
+          </a:p>
+          <a:p>
+            <a:pPr lvl="1">
+              <a:lnSpc>
+                <a:spcPct val="114999"/>
+              </a:lnSpc>
+            </a:pPr>
+            <a:endParaRPr lang="en-US" dirty="0"/>
           </a:p>
         </p:txBody>
       </p:sp>

</xml_diff>